<commit_message>
Presentation Progress1 Last V.
</commit_message>
<xml_diff>
--- a/Presentation/EIOM-Progress1Presentation-V.1.0.pptx
+++ b/Presentation/EIOM-Progress1Presentation-V.1.0.pptx
@@ -5,10 +5,10 @@
     <p:sldMasterId id="2147483654" r:id="rId1"/>
   </p:sldMasterIdLst>
   <p:notesMasterIdLst>
-    <p:notesMasterId r:id="rId32"/>
+    <p:notesMasterId r:id="rId33"/>
   </p:notesMasterIdLst>
   <p:handoutMasterIdLst>
-    <p:handoutMasterId r:id="rId33"/>
+    <p:handoutMasterId r:id="rId34"/>
   </p:handoutMasterIdLst>
   <p:sldIdLst>
     <p:sldId id="256" r:id="rId2"/>
@@ -40,10 +40,11 @@
     <p:sldId id="281" r:id="rId28"/>
     <p:sldId id="282" r:id="rId29"/>
     <p:sldId id="283" r:id="rId30"/>
-    <p:sldId id="284" r:id="rId31"/>
+    <p:sldId id="286" r:id="rId31"/>
+    <p:sldId id="284" r:id="rId32"/>
   </p:sldIdLst>
   <p:sldSz cx="9144000" cy="5143500" type="screen16x9"/>
-  <p:notesSz cx="6858000" cy="9144000"/>
+  <p:notesSz cx="9945688" cy="6858000"/>
   <p:defaultTextStyle>
     <a:defPPr marR="0" algn="l" rtl="0">
       <a:lnSpc>
@@ -293,6 +294,7 @@
             <p14:sldId id="281"/>
             <p14:sldId id="282"/>
             <p14:sldId id="283"/>
+            <p14:sldId id="286"/>
             <p14:sldId id="284"/>
           </p14:sldIdLst>
         </p14:section>
@@ -336,8 +338,8 @@
         </p:nvSpPr>
         <p:spPr>
           <a:xfrm>
-            <a:off x="0" y="0"/>
-            <a:ext cx="2971800" cy="458788"/>
+            <a:off x="0" y="1"/>
+            <a:ext cx="4309798" cy="344091"/>
           </a:xfrm>
           <a:prstGeom prst="rect">
             <a:avLst/>
@@ -367,8 +369,8 @@
         </p:nvSpPr>
         <p:spPr>
           <a:xfrm>
-            <a:off x="3884613" y="0"/>
-            <a:ext cx="2971800" cy="458788"/>
+            <a:off x="5633588" y="1"/>
+            <a:ext cx="4309798" cy="344091"/>
           </a:xfrm>
           <a:prstGeom prst="rect">
             <a:avLst/>
@@ -384,7 +386,7 @@
           <a:p>
             <a:fld id="{D6BF7726-993B-45A4-9403-E366E7851A47}" type="datetimeFigureOut">
               <a:rPr lang="th-TH" smtClean="0"/>
-              <a:t>13/07/57</a:t>
+              <a:t>15/07/57</a:t>
             </a:fld>
             <a:endParaRPr lang="th-TH"/>
           </a:p>
@@ -402,8 +404,8 @@
         </p:nvSpPr>
         <p:spPr>
           <a:xfrm>
-            <a:off x="0" y="8685213"/>
-            <a:ext cx="2971800" cy="458787"/>
+            <a:off x="0" y="6513910"/>
+            <a:ext cx="4309798" cy="344090"/>
           </a:xfrm>
           <a:prstGeom prst="rect">
             <a:avLst/>
@@ -433,8 +435,8 @@
         </p:nvSpPr>
         <p:spPr>
           <a:xfrm>
-            <a:off x="3884613" y="8685213"/>
-            <a:ext cx="2971800" cy="458787"/>
+            <a:off x="5633588" y="6513910"/>
+            <a:ext cx="4309798" cy="344090"/>
           </a:xfrm>
           <a:prstGeom prst="rect">
             <a:avLst/>
@@ -502,8 +504,8 @@
         </p:nvSpPr>
         <p:spPr>
           <a:xfrm>
-            <a:off x="381187" y="685800"/>
-            <a:ext cx="6096299" cy="3429000"/>
+            <a:off x="2686050" y="514350"/>
+            <a:ext cx="4573588" cy="2571750"/>
           </a:xfrm>
           <a:custGeom>
             <a:avLst/>
@@ -553,8 +555,8 @@
         </p:nvSpPr>
         <p:spPr>
           <a:xfrm>
-            <a:off x="685800" y="4343400"/>
-            <a:ext cx="5486399" cy="4114800"/>
+            <a:off x="994571" y="3257550"/>
+            <a:ext cx="7956549" cy="3086100"/>
           </a:xfrm>
           <a:prstGeom prst="rect">
             <a:avLst/>
@@ -760,8 +762,8 @@
         </p:nvSpPr>
         <p:spPr>
           <a:xfrm>
-            <a:off x="381000" y="685800"/>
-            <a:ext cx="6096000" cy="3429000"/>
+            <a:off x="2686050" y="514350"/>
+            <a:ext cx="4573588" cy="2571750"/>
           </a:xfrm>
           <a:custGeom>
             <a:avLst/>
@@ -811,8 +813,8 @@
         </p:nvSpPr>
         <p:spPr>
           <a:xfrm>
-            <a:off x="685800" y="4343400"/>
-            <a:ext cx="5486399" cy="4114800"/>
+            <a:off x="994571" y="3257550"/>
+            <a:ext cx="7956549" cy="3086100"/>
           </a:xfrm>
           <a:prstGeom prst="rect">
             <a:avLst/>
@@ -876,8 +878,8 @@
         </p:nvSpPr>
         <p:spPr>
           <a:xfrm>
-            <a:off x="381000" y="685800"/>
-            <a:ext cx="6096000" cy="3429000"/>
+            <a:off x="2686050" y="514350"/>
+            <a:ext cx="4573588" cy="2571750"/>
           </a:xfrm>
           <a:custGeom>
             <a:avLst/>
@@ -927,8 +929,8 @@
         </p:nvSpPr>
         <p:spPr>
           <a:xfrm>
-            <a:off x="685800" y="4343400"/>
-            <a:ext cx="5486399" cy="4114800"/>
+            <a:off x="994571" y="3257550"/>
+            <a:ext cx="7956549" cy="3086100"/>
           </a:xfrm>
           <a:prstGeom prst="rect">
             <a:avLst/>
@@ -992,8 +994,8 @@
         </p:nvSpPr>
         <p:spPr>
           <a:xfrm>
-            <a:off x="381000" y="685800"/>
-            <a:ext cx="6096000" cy="3429000"/>
+            <a:off x="2686050" y="514350"/>
+            <a:ext cx="4573588" cy="2571750"/>
           </a:xfrm>
           <a:custGeom>
             <a:avLst/>
@@ -1043,8 +1045,8 @@
         </p:nvSpPr>
         <p:spPr>
           <a:xfrm>
-            <a:off x="685800" y="4343400"/>
-            <a:ext cx="5486399" cy="4114800"/>
+            <a:off x="994571" y="3257550"/>
+            <a:ext cx="7956549" cy="3086100"/>
           </a:xfrm>
           <a:prstGeom prst="rect">
             <a:avLst/>
@@ -1108,8 +1110,8 @@
         </p:nvSpPr>
         <p:spPr>
           <a:xfrm>
-            <a:off x="381000" y="685800"/>
-            <a:ext cx="6096000" cy="3429000"/>
+            <a:off x="2686050" y="514350"/>
+            <a:ext cx="4573588" cy="2571750"/>
           </a:xfrm>
           <a:custGeom>
             <a:avLst/>
@@ -1159,8 +1161,8 @@
         </p:nvSpPr>
         <p:spPr>
           <a:xfrm>
-            <a:off x="685800" y="4343400"/>
-            <a:ext cx="5486399" cy="4114800"/>
+            <a:off x="994571" y="3257550"/>
+            <a:ext cx="7956549" cy="3086100"/>
           </a:xfrm>
           <a:prstGeom prst="rect">
             <a:avLst/>
@@ -1224,8 +1226,8 @@
         </p:nvSpPr>
         <p:spPr>
           <a:xfrm>
-            <a:off x="381000" y="685800"/>
-            <a:ext cx="6096000" cy="3429000"/>
+            <a:off x="2686050" y="514350"/>
+            <a:ext cx="4573588" cy="2571750"/>
           </a:xfrm>
           <a:custGeom>
             <a:avLst/>
@@ -1275,8 +1277,8 @@
         </p:nvSpPr>
         <p:spPr>
           <a:xfrm>
-            <a:off x="685800" y="4343400"/>
-            <a:ext cx="5486399" cy="4114800"/>
+            <a:off x="994571" y="3257550"/>
+            <a:ext cx="7956549" cy="3086100"/>
           </a:xfrm>
           <a:prstGeom prst="rect">
             <a:avLst/>
@@ -1340,8 +1342,8 @@
         </p:nvSpPr>
         <p:spPr>
           <a:xfrm>
-            <a:off x="381000" y="685800"/>
-            <a:ext cx="6096000" cy="3429000"/>
+            <a:off x="2686050" y="514350"/>
+            <a:ext cx="4573588" cy="2571750"/>
           </a:xfrm>
           <a:custGeom>
             <a:avLst/>
@@ -1391,8 +1393,8 @@
         </p:nvSpPr>
         <p:spPr>
           <a:xfrm>
-            <a:off x="685800" y="4343400"/>
-            <a:ext cx="5486399" cy="4114800"/>
+            <a:off x="994571" y="3257550"/>
+            <a:ext cx="7956549" cy="3086100"/>
           </a:xfrm>
           <a:prstGeom prst="rect">
             <a:avLst/>
@@ -1456,8 +1458,8 @@
         </p:nvSpPr>
         <p:spPr>
           <a:xfrm>
-            <a:off x="381000" y="685800"/>
-            <a:ext cx="6096000" cy="3429000"/>
+            <a:off x="2686050" y="514350"/>
+            <a:ext cx="4573588" cy="2571750"/>
           </a:xfrm>
           <a:custGeom>
             <a:avLst/>
@@ -1507,8 +1509,8 @@
         </p:nvSpPr>
         <p:spPr>
           <a:xfrm>
-            <a:off x="685800" y="4343400"/>
-            <a:ext cx="5486399" cy="4114800"/>
+            <a:off x="994571" y="3257550"/>
+            <a:ext cx="7956549" cy="3086100"/>
           </a:xfrm>
           <a:prstGeom prst="rect">
             <a:avLst/>
@@ -1526,7 +1528,7 @@
               </a:spcBef>
               <a:buNone/>
             </a:pPr>
-            <a:endParaRPr/>
+            <a:endParaRPr dirty="0"/>
           </a:p>
         </p:txBody>
       </p:sp>
@@ -1572,8 +1574,8 @@
         </p:nvSpPr>
         <p:spPr>
           <a:xfrm>
-            <a:off x="381000" y="685800"/>
-            <a:ext cx="6096000" cy="3429000"/>
+            <a:off x="2686050" y="514350"/>
+            <a:ext cx="4573588" cy="2571750"/>
           </a:xfrm>
           <a:custGeom>
             <a:avLst/>
@@ -1623,8 +1625,8 @@
         </p:nvSpPr>
         <p:spPr>
           <a:xfrm>
-            <a:off x="685800" y="4343400"/>
-            <a:ext cx="5486399" cy="4114800"/>
+            <a:off x="994571" y="3257550"/>
+            <a:ext cx="7956549" cy="3086100"/>
           </a:xfrm>
           <a:prstGeom prst="rect">
             <a:avLst/>
@@ -1688,8 +1690,8 @@
         </p:nvSpPr>
         <p:spPr>
           <a:xfrm>
-            <a:off x="381000" y="685800"/>
-            <a:ext cx="6096000" cy="3429000"/>
+            <a:off x="2686050" y="514350"/>
+            <a:ext cx="4573588" cy="2571750"/>
           </a:xfrm>
           <a:custGeom>
             <a:avLst/>
@@ -1739,8 +1741,8 @@
         </p:nvSpPr>
         <p:spPr>
           <a:xfrm>
-            <a:off x="685800" y="4343400"/>
-            <a:ext cx="5486399" cy="4114800"/>
+            <a:off x="994571" y="3257550"/>
+            <a:ext cx="7956549" cy="3086100"/>
           </a:xfrm>
           <a:prstGeom prst="rect">
             <a:avLst/>
@@ -1804,8 +1806,8 @@
         </p:nvSpPr>
         <p:spPr>
           <a:xfrm>
-            <a:off x="381000" y="685800"/>
-            <a:ext cx="6096000" cy="3429000"/>
+            <a:off x="2686050" y="514350"/>
+            <a:ext cx="4573588" cy="2571750"/>
           </a:xfrm>
           <a:custGeom>
             <a:avLst/>
@@ -1855,8 +1857,8 @@
         </p:nvSpPr>
         <p:spPr>
           <a:xfrm>
-            <a:off x="685800" y="4343400"/>
-            <a:ext cx="5486399" cy="4114800"/>
+            <a:off x="994571" y="3257550"/>
+            <a:ext cx="7956549" cy="3086100"/>
           </a:xfrm>
           <a:prstGeom prst="rect">
             <a:avLst/>
@@ -1920,8 +1922,8 @@
         </p:nvSpPr>
         <p:spPr>
           <a:xfrm>
-            <a:off x="381000" y="685800"/>
-            <a:ext cx="6096000" cy="3429000"/>
+            <a:off x="2686050" y="514350"/>
+            <a:ext cx="4573588" cy="2571750"/>
           </a:xfrm>
           <a:custGeom>
             <a:avLst/>
@@ -1971,8 +1973,8 @@
         </p:nvSpPr>
         <p:spPr>
           <a:xfrm>
-            <a:off x="685800" y="4343400"/>
-            <a:ext cx="5486399" cy="4114800"/>
+            <a:off x="994571" y="3257550"/>
+            <a:ext cx="7956549" cy="3086100"/>
           </a:xfrm>
           <a:prstGeom prst="rect">
             <a:avLst/>
@@ -2036,8 +2038,8 @@
         </p:nvSpPr>
         <p:spPr>
           <a:xfrm>
-            <a:off x="381000" y="685800"/>
-            <a:ext cx="6096000" cy="3429000"/>
+            <a:off x="2686050" y="514350"/>
+            <a:ext cx="4573588" cy="2571750"/>
           </a:xfrm>
           <a:custGeom>
             <a:avLst/>
@@ -2087,8 +2089,8 @@
         </p:nvSpPr>
         <p:spPr>
           <a:xfrm>
-            <a:off x="685800" y="4343400"/>
-            <a:ext cx="5486399" cy="4114800"/>
+            <a:off x="994571" y="3257550"/>
+            <a:ext cx="7956549" cy="3086100"/>
           </a:xfrm>
           <a:prstGeom prst="rect">
             <a:avLst/>
@@ -2152,8 +2154,8 @@
         </p:nvSpPr>
         <p:spPr>
           <a:xfrm>
-            <a:off x="381000" y="685800"/>
-            <a:ext cx="6096000" cy="3429000"/>
+            <a:off x="2686050" y="514350"/>
+            <a:ext cx="4573588" cy="2571750"/>
           </a:xfrm>
           <a:custGeom>
             <a:avLst/>
@@ -2203,8 +2205,8 @@
         </p:nvSpPr>
         <p:spPr>
           <a:xfrm>
-            <a:off x="685800" y="4343400"/>
-            <a:ext cx="5486399" cy="4114800"/>
+            <a:off x="994571" y="3257550"/>
+            <a:ext cx="7956549" cy="3086100"/>
           </a:xfrm>
           <a:prstGeom prst="rect">
             <a:avLst/>
@@ -2268,8 +2270,8 @@
         </p:nvSpPr>
         <p:spPr>
           <a:xfrm>
-            <a:off x="381000" y="685800"/>
-            <a:ext cx="6096000" cy="3429000"/>
+            <a:off x="2686050" y="514350"/>
+            <a:ext cx="4573588" cy="2571750"/>
           </a:xfrm>
           <a:custGeom>
             <a:avLst/>
@@ -2319,8 +2321,8 @@
         </p:nvSpPr>
         <p:spPr>
           <a:xfrm>
-            <a:off x="685800" y="4343400"/>
-            <a:ext cx="5486399" cy="4114800"/>
+            <a:off x="994571" y="3257550"/>
+            <a:ext cx="7956549" cy="3086100"/>
           </a:xfrm>
           <a:prstGeom prst="rect">
             <a:avLst/>
@@ -2384,8 +2386,8 @@
         </p:nvSpPr>
         <p:spPr>
           <a:xfrm>
-            <a:off x="381000" y="685800"/>
-            <a:ext cx="6096000" cy="3429000"/>
+            <a:off x="2686050" y="514350"/>
+            <a:ext cx="4573588" cy="2571750"/>
           </a:xfrm>
           <a:custGeom>
             <a:avLst/>
@@ -2435,8 +2437,8 @@
         </p:nvSpPr>
         <p:spPr>
           <a:xfrm>
-            <a:off x="685800" y="4343400"/>
-            <a:ext cx="5486399" cy="4114800"/>
+            <a:off x="994571" y="3257550"/>
+            <a:ext cx="7956549" cy="3086100"/>
           </a:xfrm>
           <a:prstGeom prst="rect">
             <a:avLst/>
@@ -2500,8 +2502,8 @@
         </p:nvSpPr>
         <p:spPr>
           <a:xfrm>
-            <a:off x="381000" y="685800"/>
-            <a:ext cx="6096000" cy="3429000"/>
+            <a:off x="2686050" y="514350"/>
+            <a:ext cx="4573588" cy="2571750"/>
           </a:xfrm>
           <a:custGeom>
             <a:avLst/>
@@ -2551,8 +2553,8 @@
         </p:nvSpPr>
         <p:spPr>
           <a:xfrm>
-            <a:off x="685800" y="4343400"/>
-            <a:ext cx="5486399" cy="4114800"/>
+            <a:off x="994571" y="3257550"/>
+            <a:ext cx="7956549" cy="3086100"/>
           </a:xfrm>
           <a:prstGeom prst="rect">
             <a:avLst/>
@@ -2616,8 +2618,8 @@
         </p:nvSpPr>
         <p:spPr>
           <a:xfrm>
-            <a:off x="381000" y="685800"/>
-            <a:ext cx="6096000" cy="3429000"/>
+            <a:off x="2686050" y="514350"/>
+            <a:ext cx="4573588" cy="2571750"/>
           </a:xfrm>
           <a:custGeom>
             <a:avLst/>
@@ -2667,8 +2669,8 @@
         </p:nvSpPr>
         <p:spPr>
           <a:xfrm>
-            <a:off x="685800" y="4343400"/>
-            <a:ext cx="5486399" cy="4114800"/>
+            <a:off x="994571" y="3257550"/>
+            <a:ext cx="7956549" cy="3086100"/>
           </a:xfrm>
           <a:prstGeom prst="rect">
             <a:avLst/>
@@ -2732,8 +2734,8 @@
         </p:nvSpPr>
         <p:spPr>
           <a:xfrm>
-            <a:off x="381000" y="685800"/>
-            <a:ext cx="6096000" cy="3429000"/>
+            <a:off x="2686050" y="514350"/>
+            <a:ext cx="4573588" cy="2571750"/>
           </a:xfrm>
           <a:custGeom>
             <a:avLst/>
@@ -2783,8 +2785,8 @@
         </p:nvSpPr>
         <p:spPr>
           <a:xfrm>
-            <a:off x="685800" y="4343400"/>
-            <a:ext cx="5486399" cy="4114800"/>
+            <a:off x="994571" y="3257550"/>
+            <a:ext cx="7956549" cy="3086100"/>
           </a:xfrm>
           <a:prstGeom prst="rect">
             <a:avLst/>
@@ -2848,8 +2850,8 @@
         </p:nvSpPr>
         <p:spPr>
           <a:xfrm>
-            <a:off x="381000" y="685800"/>
-            <a:ext cx="6096000" cy="3429000"/>
+            <a:off x="2686050" y="514350"/>
+            <a:ext cx="4573588" cy="2571750"/>
           </a:xfrm>
           <a:custGeom>
             <a:avLst/>
@@ -2899,8 +2901,8 @@
         </p:nvSpPr>
         <p:spPr>
           <a:xfrm>
-            <a:off x="685800" y="4343400"/>
-            <a:ext cx="5486399" cy="4114800"/>
+            <a:off x="994571" y="3257550"/>
+            <a:ext cx="7956549" cy="3086100"/>
           </a:xfrm>
           <a:prstGeom prst="rect">
             <a:avLst/>
@@ -2964,8 +2966,8 @@
         </p:nvSpPr>
         <p:spPr>
           <a:xfrm>
-            <a:off x="381000" y="685800"/>
-            <a:ext cx="6096000" cy="3429000"/>
+            <a:off x="2686050" y="514350"/>
+            <a:ext cx="4573588" cy="2571750"/>
           </a:xfrm>
           <a:custGeom>
             <a:avLst/>
@@ -3015,8 +3017,8 @@
         </p:nvSpPr>
         <p:spPr>
           <a:xfrm>
-            <a:off x="685800" y="4343400"/>
-            <a:ext cx="5486399" cy="4114800"/>
+            <a:off x="994571" y="3257550"/>
+            <a:ext cx="7956549" cy="3086100"/>
           </a:xfrm>
           <a:prstGeom prst="rect">
             <a:avLst/>
@@ -3080,8 +3082,8 @@
         </p:nvSpPr>
         <p:spPr>
           <a:xfrm>
-            <a:off x="381000" y="685800"/>
-            <a:ext cx="6096000" cy="3429000"/>
+            <a:off x="2686050" y="514350"/>
+            <a:ext cx="4573588" cy="2571750"/>
           </a:xfrm>
           <a:custGeom>
             <a:avLst/>
@@ -3131,8 +3133,8 @@
         </p:nvSpPr>
         <p:spPr>
           <a:xfrm>
-            <a:off x="685800" y="4343400"/>
-            <a:ext cx="5486399" cy="4114800"/>
+            <a:off x="994571" y="3257550"/>
+            <a:ext cx="7956549" cy="3086100"/>
           </a:xfrm>
           <a:prstGeom prst="rect">
             <a:avLst/>
@@ -3196,8 +3198,8 @@
         </p:nvSpPr>
         <p:spPr>
           <a:xfrm>
-            <a:off x="381000" y="685800"/>
-            <a:ext cx="6096000" cy="3429000"/>
+            <a:off x="2686050" y="514350"/>
+            <a:ext cx="4573588" cy="2571750"/>
           </a:xfrm>
           <a:custGeom>
             <a:avLst/>
@@ -3247,8 +3249,8 @@
         </p:nvSpPr>
         <p:spPr>
           <a:xfrm>
-            <a:off x="685800" y="4343400"/>
-            <a:ext cx="5486399" cy="4114800"/>
+            <a:off x="994571" y="3257550"/>
+            <a:ext cx="7956549" cy="3086100"/>
           </a:xfrm>
           <a:prstGeom prst="rect">
             <a:avLst/>
@@ -3312,8 +3314,8 @@
         </p:nvSpPr>
         <p:spPr>
           <a:xfrm>
-            <a:off x="381000" y="685800"/>
-            <a:ext cx="6096000" cy="3429000"/>
+            <a:off x="2686050" y="514350"/>
+            <a:ext cx="4573588" cy="2571750"/>
           </a:xfrm>
           <a:custGeom>
             <a:avLst/>
@@ -3363,8 +3365,8 @@
         </p:nvSpPr>
         <p:spPr>
           <a:xfrm>
-            <a:off x="685800" y="4343400"/>
-            <a:ext cx="5486399" cy="4114800"/>
+            <a:off x="994571" y="3257550"/>
+            <a:ext cx="7956549" cy="3086100"/>
           </a:xfrm>
           <a:prstGeom prst="rect">
             <a:avLst/>
@@ -3428,8 +3430,8 @@
         </p:nvSpPr>
         <p:spPr>
           <a:xfrm>
-            <a:off x="381000" y="685800"/>
-            <a:ext cx="6096000" cy="3429000"/>
+            <a:off x="2686050" y="514350"/>
+            <a:ext cx="4573588" cy="2571750"/>
           </a:xfrm>
           <a:custGeom>
             <a:avLst/>
@@ -3479,8 +3481,8 @@
         </p:nvSpPr>
         <p:spPr>
           <a:xfrm>
-            <a:off x="685800" y="4343400"/>
-            <a:ext cx="5486399" cy="4114800"/>
+            <a:off x="994571" y="3257550"/>
+            <a:ext cx="7956549" cy="3086100"/>
           </a:xfrm>
           <a:prstGeom prst="rect">
             <a:avLst/>
@@ -3544,8 +3546,8 @@
         </p:nvSpPr>
         <p:spPr>
           <a:xfrm>
-            <a:off x="381000" y="685800"/>
-            <a:ext cx="6096000" cy="3429000"/>
+            <a:off x="2686050" y="514350"/>
+            <a:ext cx="4573588" cy="2571750"/>
           </a:xfrm>
           <a:custGeom>
             <a:avLst/>
@@ -3595,8 +3597,8 @@
         </p:nvSpPr>
         <p:spPr>
           <a:xfrm>
-            <a:off x="685800" y="4343400"/>
-            <a:ext cx="5486399" cy="4114800"/>
+            <a:off x="994571" y="3257550"/>
+            <a:ext cx="7956549" cy="3086100"/>
           </a:xfrm>
           <a:prstGeom prst="rect">
             <a:avLst/>
@@ -3660,8 +3662,8 @@
         </p:nvSpPr>
         <p:spPr>
           <a:xfrm>
-            <a:off x="381000" y="685800"/>
-            <a:ext cx="6096000" cy="3429000"/>
+            <a:off x="2686050" y="514350"/>
+            <a:ext cx="4573588" cy="2571750"/>
           </a:xfrm>
           <a:custGeom>
             <a:avLst/>
@@ -3711,8 +3713,8 @@
         </p:nvSpPr>
         <p:spPr>
           <a:xfrm>
-            <a:off x="685800" y="4343400"/>
-            <a:ext cx="5486399" cy="4114800"/>
+            <a:off x="994571" y="3257550"/>
+            <a:ext cx="7956549" cy="3086100"/>
           </a:xfrm>
           <a:prstGeom prst="rect">
             <a:avLst/>
@@ -3776,8 +3778,8 @@
         </p:nvSpPr>
         <p:spPr>
           <a:xfrm>
-            <a:off x="381000" y="685800"/>
-            <a:ext cx="6096000" cy="3429000"/>
+            <a:off x="2686050" y="514350"/>
+            <a:ext cx="4573588" cy="2571750"/>
           </a:xfrm>
           <a:custGeom>
             <a:avLst/>
@@ -3827,8 +3829,8 @@
         </p:nvSpPr>
         <p:spPr>
           <a:xfrm>
-            <a:off x="685800" y="4343400"/>
-            <a:ext cx="5486399" cy="4114800"/>
+            <a:off x="994571" y="3257550"/>
+            <a:ext cx="7956549" cy="3086100"/>
           </a:xfrm>
           <a:prstGeom prst="rect">
             <a:avLst/>
@@ -3892,8 +3894,8 @@
         </p:nvSpPr>
         <p:spPr>
           <a:xfrm>
-            <a:off x="381000" y="685800"/>
-            <a:ext cx="6096000" cy="3429000"/>
+            <a:off x="2686050" y="514350"/>
+            <a:ext cx="4573588" cy="2571750"/>
           </a:xfrm>
           <a:custGeom>
             <a:avLst/>
@@ -3943,8 +3945,8 @@
         </p:nvSpPr>
         <p:spPr>
           <a:xfrm>
-            <a:off x="685800" y="4343400"/>
-            <a:ext cx="5486399" cy="4114800"/>
+            <a:off x="994571" y="3257550"/>
+            <a:ext cx="7956549" cy="3086100"/>
           </a:xfrm>
           <a:prstGeom prst="rect">
             <a:avLst/>
@@ -4008,8 +4010,8 @@
         </p:nvSpPr>
         <p:spPr>
           <a:xfrm>
-            <a:off x="381000" y="685800"/>
-            <a:ext cx="6096000" cy="3429000"/>
+            <a:off x="2686050" y="514350"/>
+            <a:ext cx="4573588" cy="2571750"/>
           </a:xfrm>
           <a:custGeom>
             <a:avLst/>
@@ -4059,8 +4061,8 @@
         </p:nvSpPr>
         <p:spPr>
           <a:xfrm>
-            <a:off x="685800" y="4343400"/>
-            <a:ext cx="5486399" cy="4114800"/>
+            <a:off x="994571" y="3257550"/>
+            <a:ext cx="7956549" cy="3086100"/>
           </a:xfrm>
           <a:prstGeom prst="rect">
             <a:avLst/>
@@ -10890,7 +10892,7 @@
               </a:spcBef>
               <a:buNone/>
             </a:pPr>
-            <a:endParaRPr sz="2600"/>
+            <a:endParaRPr sz="2600" dirty="0"/>
           </a:p>
           <a:p>
             <a:pPr lvl="0" algn="ctr" rtl="0">
@@ -10905,9 +10907,14 @@
               <a:buNone/>
             </a:pPr>
             <a:r>
-              <a:rPr lang="en" sz="2600"/>
-              <a:t>User Requirement Specification : consist of 8 ๊URS</a:t>
+              <a:rPr lang="en" sz="2600" dirty="0"/>
+              <a:t>User Requirement Specification : consist of 8 </a:t>
             </a:r>
+            <a:r>
+              <a:rPr lang="en" sz="2600" dirty="0" smtClean="0"/>
+              <a:t>URS</a:t>
+            </a:r>
+            <a:endParaRPr lang="en" sz="2600" dirty="0"/>
           </a:p>
           <a:p>
             <a:pPr lvl="0" algn="ctr" rtl="0">
@@ -10920,7 +10927,7 @@
               <a:buFont typeface="Arial"/>
               <a:buNone/>
             </a:pPr>
-            <a:endParaRPr sz="2600"/>
+            <a:endParaRPr sz="2600" dirty="0"/>
           </a:p>
           <a:p>
             <a:pPr lvl="0" algn="ctr" rtl="0">
@@ -10935,7 +10942,7 @@
               <a:buNone/>
             </a:pPr>
             <a:r>
-              <a:rPr lang="en" sz="2600"/>
+              <a:rPr lang="en" sz="2600" dirty="0"/>
               <a:t>System Requirement Specification: consist of 19 SRS</a:t>
             </a:r>
           </a:p>
@@ -10946,7 +10953,7 @@
               </a:spcBef>
               <a:buNone/>
             </a:pPr>
-            <a:endParaRPr/>
+            <a:endParaRPr dirty="0"/>
           </a:p>
         </p:txBody>
       </p:sp>
@@ -13848,6 +13855,13 @@
   <p:transition spd="slow">
     <p:cut/>
   </p:transition>
+  <p:timing>
+    <p:tnLst>
+      <p:par>
+        <p:cTn id="1" dur="indefinite" restart="never" nodeType="tmRoot"/>
+      </p:par>
+    </p:tnLst>
+  </p:timing>
 </p:sld>
 </file>
 
@@ -13900,8 +13914,12 @@
               <a:buNone/>
             </a:pPr>
             <a:r>
-              <a:rPr lang="en"/>
-              <a:t>๊ืUnit Test Case</a:t>
+              <a:rPr lang="en" dirty="0" smtClean="0"/>
+              <a:t>Unit </a:t>
+            </a:r>
+            <a:r>
+              <a:rPr lang="en" dirty="0"/>
+              <a:t>Test Case</a:t>
             </a:r>
           </a:p>
         </p:txBody>
@@ -13914,7 +13932,7 @@
         </p:nvGraphicFramePr>
         <p:xfrm>
           <a:off x="597112" y="1744825"/>
-          <a:ext cx="3000000" cy="3000000"/>
+          <a:ext cx="7949775" cy="2764960"/>
         </p:xfrm>
         <a:graphic>
           <a:graphicData uri="http://schemas.openxmlformats.org/drawingml/2006/table">
@@ -15817,6 +15835,13 @@
   <p:transition spd="slow">
     <p:cut/>
   </p:transition>
+  <p:timing>
+    <p:tnLst>
+      <p:par>
+        <p:cTn id="1" dur="indefinite" restart="never" nodeType="tmRoot"/>
+      </p:par>
+    </p:tnLst>
+  </p:timing>
 </p:sld>
 </file>
 
@@ -19852,7 +19877,7 @@
               <a:buNone/>
             </a:pPr>
             <a:r>
-              <a:rPr lang="en" sz="1600" dirty="0">
+              <a:rPr lang="en" sz="1600" dirty="0" smtClean="0">
                 <a:solidFill>
                   <a:schemeClr val="dk1"/>
                 </a:solidFill>
@@ -19876,7 +19901,7 @@
               <a:buNone/>
             </a:pPr>
             <a:r>
-              <a:rPr lang="en" sz="1600" dirty="0">
+              <a:rPr lang="en" sz="1600" dirty="0" smtClean="0">
                 <a:solidFill>
                   <a:schemeClr val="dk1"/>
                 </a:solidFill>
@@ -19895,7 +19920,7 @@
               <a:buNone/>
             </a:pPr>
             <a:r>
-              <a:rPr lang="en" sz="1600" dirty="0">
+              <a:rPr lang="en" sz="1600" dirty="0" smtClean="0">
                 <a:solidFill>
                   <a:schemeClr val="dk1"/>
                 </a:solidFill>
@@ -19919,7 +19944,7 @@
               <a:buNone/>
             </a:pPr>
             <a:r>
-              <a:rPr lang="en" sz="1600" dirty="0">
+              <a:rPr lang="en" sz="1600" dirty="0" smtClean="0">
                 <a:solidFill>
                   <a:schemeClr val="dk1"/>
                 </a:solidFill>
@@ -20266,7 +20291,7 @@
                                     </p:set>
                                     <p:animEffect transition="in" filter="fade">
                                       <p:cBhvr>
-                                        <p:cTn id="23" dur="1000"/>
+                                        <p:cTn id="23" dur="500"/>
                                         <p:tgtEl>
                                           <p:spTgt spid="42">
                                             <p:txEl>
@@ -20279,33 +20304,15 @@
                                   </p:childTnLst>
                                 </p:cTn>
                               </p:par>
-                            </p:childTnLst>
-                          </p:cTn>
-                        </p:par>
-                      </p:childTnLst>
-                    </p:cTn>
-                  </p:par>
-                  <p:par>
-                    <p:cTn id="24" fill="hold">
-                      <p:stCondLst>
-                        <p:cond delay="indefinite"/>
-                      </p:stCondLst>
-                      <p:childTnLst>
-                        <p:par>
-                          <p:cTn id="25" fill="hold">
-                            <p:stCondLst>
-                              <p:cond delay="0"/>
-                            </p:stCondLst>
-                            <p:childTnLst>
                               <p:par>
-                                <p:cTn id="26" presetID="10" presetClass="entr" presetSubtype="0" fill="hold" nodeType="clickEffect">
+                                <p:cTn id="24" presetID="10" presetClass="entr" presetSubtype="0" fill="hold" nodeType="withEffect">
                                   <p:stCondLst>
                                     <p:cond delay="0"/>
                                   </p:stCondLst>
                                   <p:childTnLst>
                                     <p:set>
                                       <p:cBhvr>
-                                        <p:cTn id="27" dur="1" fill="hold">
+                                        <p:cTn id="25" dur="1" fill="hold">
                                           <p:stCondLst>
                                             <p:cond delay="0"/>
                                           </p:stCondLst>
@@ -20327,7 +20334,7 @@
                                     </p:set>
                                     <p:animEffect transition="in" filter="fade">
                                       <p:cBhvr>
-                                        <p:cTn id="28" dur="1000"/>
+                                        <p:cTn id="26" dur="500"/>
                                         <p:tgtEl>
                                           <p:spTgt spid="42">
                                             <p:txEl>
@@ -20340,33 +20347,15 @@
                                   </p:childTnLst>
                                 </p:cTn>
                               </p:par>
-                            </p:childTnLst>
-                          </p:cTn>
-                        </p:par>
-                      </p:childTnLst>
-                    </p:cTn>
-                  </p:par>
-                  <p:par>
-                    <p:cTn id="29" fill="hold">
-                      <p:stCondLst>
-                        <p:cond delay="indefinite"/>
-                      </p:stCondLst>
-                      <p:childTnLst>
-                        <p:par>
-                          <p:cTn id="30" fill="hold">
-                            <p:stCondLst>
-                              <p:cond delay="0"/>
-                            </p:stCondLst>
-                            <p:childTnLst>
                               <p:par>
-                                <p:cTn id="31" presetID="10" presetClass="entr" presetSubtype="0" fill="hold" nodeType="clickEffect">
+                                <p:cTn id="27" presetID="10" presetClass="entr" presetSubtype="0" fill="hold" nodeType="withEffect">
                                   <p:stCondLst>
                                     <p:cond delay="0"/>
                                   </p:stCondLst>
                                   <p:childTnLst>
                                     <p:set>
                                       <p:cBhvr>
-                                        <p:cTn id="32" dur="1" fill="hold">
+                                        <p:cTn id="28" dur="1" fill="hold">
                                           <p:stCondLst>
                                             <p:cond delay="0"/>
                                           </p:stCondLst>
@@ -20388,7 +20377,7 @@
                                     </p:set>
                                     <p:animEffect transition="in" filter="fade">
                                       <p:cBhvr>
-                                        <p:cTn id="33" dur="1000"/>
+                                        <p:cTn id="29" dur="500"/>
                                         <p:tgtEl>
                                           <p:spTgt spid="42">
                                             <p:txEl>
@@ -20401,33 +20390,15 @@
                                   </p:childTnLst>
                                 </p:cTn>
                               </p:par>
-                            </p:childTnLst>
-                          </p:cTn>
-                        </p:par>
-                      </p:childTnLst>
-                    </p:cTn>
-                  </p:par>
-                  <p:par>
-                    <p:cTn id="34" fill="hold">
-                      <p:stCondLst>
-                        <p:cond delay="indefinite"/>
-                      </p:stCondLst>
-                      <p:childTnLst>
-                        <p:par>
-                          <p:cTn id="35" fill="hold">
-                            <p:stCondLst>
-                              <p:cond delay="0"/>
-                            </p:stCondLst>
-                            <p:childTnLst>
                               <p:par>
-                                <p:cTn id="36" presetID="10" presetClass="entr" presetSubtype="0" fill="hold" nodeType="clickEffect">
+                                <p:cTn id="30" presetID="10" presetClass="entr" presetSubtype="0" fill="hold" nodeType="withEffect">
                                   <p:stCondLst>
                                     <p:cond delay="0"/>
                                   </p:stCondLst>
                                   <p:childTnLst>
                                     <p:set>
                                       <p:cBhvr>
-                                        <p:cTn id="37" dur="1" fill="hold">
+                                        <p:cTn id="31" dur="1" fill="hold">
                                           <p:stCondLst>
                                             <p:cond delay="0"/>
                                           </p:stCondLst>
@@ -20449,7 +20420,7 @@
                                     </p:set>
                                     <p:animEffect transition="in" filter="fade">
                                       <p:cBhvr>
-                                        <p:cTn id="38" dur="1000"/>
+                                        <p:cTn id="32" dur="500"/>
                                         <p:tgtEl>
                                           <p:spTgt spid="42">
                                             <p:txEl>
@@ -20494,6 +20465,89 @@
 </file>
 
 <file path=ppt/slides/slide30.xml><?xml version="1.0" encoding="utf-8"?>
+<p:sld xmlns:a="http://schemas.openxmlformats.org/drawingml/2006/main" xmlns:r="http://schemas.openxmlformats.org/officeDocument/2006/relationships" xmlns:p="http://schemas.openxmlformats.org/presentationml/2006/main">
+  <p:cSld>
+    <p:spTree>
+      <p:nvGrpSpPr>
+        <p:cNvPr id="1" name=""/>
+        <p:cNvGrpSpPr/>
+        <p:nvPr/>
+      </p:nvGrpSpPr>
+      <p:grpSpPr>
+        <a:xfrm>
+          <a:off x="0" y="0"/>
+          <a:ext cx="0" cy="0"/>
+          <a:chOff x="0" y="0"/>
+          <a:chExt cx="0" cy="0"/>
+        </a:xfrm>
+      </p:grpSpPr>
+      <p:sp>
+        <p:nvSpPr>
+          <p:cNvPr id="6" name="ชื่อเรื่อง 5"/>
+          <p:cNvSpPr>
+            <a:spLocks noGrp="1"/>
+          </p:cNvSpPr>
+          <p:nvPr>
+            <p:ph type="ctrTitle"/>
+          </p:nvPr>
+        </p:nvSpPr>
+        <p:spPr/>
+        <p:txBody>
+          <a:bodyPr/>
+          <a:lstStyle/>
+          <a:p>
+            <a:r>
+              <a:rPr lang="en-US" dirty="0" smtClean="0"/>
+              <a:t>Code Testing</a:t>
+            </a:r>
+            <a:endParaRPr lang="th-TH" dirty="0"/>
+          </a:p>
+        </p:txBody>
+      </p:sp>
+      <p:sp>
+        <p:nvSpPr>
+          <p:cNvPr id="5" name="ตัวแทนหมายเลขภาพนิ่ง 4"/>
+          <p:cNvSpPr>
+            <a:spLocks noGrp="1"/>
+          </p:cNvSpPr>
+          <p:nvPr>
+            <p:ph type="sldNum" sz="quarter" idx="4"/>
+          </p:nvPr>
+        </p:nvSpPr>
+        <p:spPr/>
+        <p:txBody>
+          <a:bodyPr/>
+          <a:lstStyle/>
+          <a:p>
+            <a:fld id="{457FF3DD-3C07-4F68-8BE7-A6E5ECB5D601}" type="slidenum">
+              <a:rPr lang="th-TH" smtClean="0"/>
+              <a:t>29</a:t>
+            </a:fld>
+            <a:endParaRPr lang="th-TH" dirty="0"/>
+          </a:p>
+        </p:txBody>
+      </p:sp>
+    </p:spTree>
+    <p:extLst>
+      <p:ext uri="{BB962C8B-B14F-4D97-AF65-F5344CB8AC3E}">
+        <p14:creationId xmlns:p14="http://schemas.microsoft.com/office/powerpoint/2010/main" val="2272691740"/>
+      </p:ext>
+    </p:extLst>
+  </p:cSld>
+  <p:clrMapOvr>
+    <a:masterClrMapping/>
+  </p:clrMapOvr>
+  <p:timing>
+    <p:tnLst>
+      <p:par>
+        <p:cTn id="1" dur="indefinite" restart="never" nodeType="tmRoot"/>
+      </p:par>
+    </p:tnLst>
+  </p:timing>
+</p:sld>
+</file>
+
+<file path=ppt/slides/slide31.xml><?xml version="1.0" encoding="utf-8"?>
 <p:sld xmlns:a="http://schemas.openxmlformats.org/drawingml/2006/main" xmlns:r="http://schemas.openxmlformats.org/officeDocument/2006/relationships" xmlns:p="http://schemas.openxmlformats.org/presentationml/2006/main">
   <p:cSld>
     <p:spTree>
@@ -20612,7 +20666,7 @@
           <a:p>
             <a:fld id="{457FF3DD-3C07-4F68-8BE7-A6E5ECB5D601}" type="slidenum">
               <a:rPr lang="th-TH" smtClean="0"/>
-              <a:t>29</a:t>
+              <a:t>30</a:t>
             </a:fld>
             <a:endParaRPr lang="th-TH" dirty="0"/>
           </a:p>
@@ -25057,7 +25111,7 @@
     </a:clrScheme>
     <a:fontScheme name="Office">
       <a:majorFont>
-        <a:latin typeface="Calibri Light" panose="020F0302020204030204"/>
+        <a:latin typeface="Calibri Light"/>
         <a:ea typeface=""/>
         <a:cs typeface=""/>
         <a:font script="Jpan" typeface="ＭＳ Ｐゴシック"/>
@@ -25092,7 +25146,7 @@
         <a:font script="Geor" typeface="Sylfaen"/>
       </a:majorFont>
       <a:minorFont>
-        <a:latin typeface="Calibri" panose="020F0502020204030204"/>
+        <a:latin typeface="Calibri"/>
         <a:ea typeface=""/>
         <a:cs typeface=""/>
         <a:font script="Jpan" typeface="ＭＳ Ｐゴシック"/>
@@ -25269,7 +25323,7 @@
   <a:extraClrSchemeLst/>
   <a:extLst>
     <a:ext uri="{05A4C25C-085E-4340-85A3-A5531E510DB2}">
-      <thm15:themeFamily xmlns:thm15="http://schemas.microsoft.com/office/thememl/2012/main" name="Office Theme" id="{62F939B6-93AF-4DB8-9C6B-D6C7DFDC589F}" vid="{4A3C46E8-61CC-4603-A589-7422A47A8E4A}"/>
+      <thm15:themeFamily xmlns="" xmlns:thm15="http://schemas.microsoft.com/office/thememl/2012/main" name="Office Theme" id="{62F939B6-93AF-4DB8-9C6B-D6C7DFDC589F}" vid="{4A3C46E8-61CC-4603-A589-7422A47A8E4A}"/>
     </a:ext>
   </a:extLst>
 </a:theme>

</xml_diff>